<commit_message>
avant de passer RDP1
</commit_message>
<xml_diff>
--- a/Etudiants/Corentin/RDP n°1.pptx
+++ b/Etudiants/Corentin/RDP n°1.pptx
@@ -7145,6 +7145,9 @@
           <a:solidFill>
             <a:srgbClr val="00B0F0"/>
           </a:solidFill>
+          <a:ln>
+            <a:noFill/>
+          </a:ln>
         </p:spPr>
         <p:style>
           <a:lnRef idx="2">
@@ -7194,6 +7197,9 @@
           <a:solidFill>
             <a:srgbClr val="00B0F0"/>
           </a:solidFill>
+          <a:ln>
+            <a:noFill/>
+          </a:ln>
         </p:spPr>
         <p:style>
           <a:lnRef idx="2">

</xml_diff>